<commit_message>
Added paper and updated the ppt
</commit_message>
<xml_diff>
--- a/Presentations/Presentation4.pptx
+++ b/Presentations/Presentation4.pptx
@@ -6,11 +6,10 @@
   </p:sldMasterIdLst>
   <p:sldIdLst>
     <p:sldId id="257" r:id="rId2"/>
-    <p:sldId id="260" r:id="rId3"/>
-    <p:sldId id="264" r:id="rId4"/>
+    <p:sldId id="264" r:id="rId3"/>
+    <p:sldId id="265" r:id="rId4"/>
     <p:sldId id="261" r:id="rId5"/>
     <p:sldId id="262" r:id="rId6"/>
-    <p:sldId id="263" r:id="rId7"/>
   </p:sldIdLst>
   <p:sldSz cx="12192000" cy="6858000"/>
   <p:notesSz cx="6858000" cy="9144000"/>
@@ -3790,6 +3789,14 @@
 <file path=ppt/slides/slide2.xml><?xml version="1.0" encoding="utf-8"?>
 <p:sld xmlns:a="http://schemas.openxmlformats.org/drawingml/2006/main" xmlns:r="http://schemas.openxmlformats.org/officeDocument/2006/relationships" xmlns:p="http://schemas.openxmlformats.org/presentationml/2006/main">
   <p:cSld>
+    <p:bg>
+      <p:bgPr>
+        <a:solidFill>
+          <a:schemeClr val="bg1"/>
+        </a:solidFill>
+        <a:effectLst/>
+      </p:bgPr>
+    </p:bg>
     <p:spTree>
       <p:nvGrpSpPr>
         <p:cNvPr id="1" name=""/>
@@ -3804,141 +3811,777 @@
           <a:chExt cx="0" cy="0"/>
         </a:xfrm>
       </p:grpSpPr>
-      <p:sp>
-        <p:nvSpPr>
-          <p:cNvPr id="2" name="Title 1">
-            <a:extLst>
-              <a:ext uri="{FF2B5EF4-FFF2-40B4-BE49-F238E27FC236}">
-                <a16:creationId xmlns:a16="http://schemas.microsoft.com/office/drawing/2014/main" id="{EBB90D6D-BA66-6645-95C6-AEFFE1C82D06}"/>
-              </a:ext>
-            </a:extLst>
-          </p:cNvPr>
-          <p:cNvSpPr>
-            <a:spLocks noGrp="1"/>
-          </p:cNvSpPr>
-          <p:nvPr>
-            <p:ph type="title"/>
-          </p:nvPr>
-        </p:nvSpPr>
-        <p:spPr/>
-        <p:txBody>
-          <a:bodyPr/>
-          <a:lstStyle/>
-          <a:p>
-            <a:r>
-              <a:rPr lang="en-US" dirty="0"/>
-              <a:t>Implementation till now..</a:t>
-            </a:r>
-          </a:p>
-        </p:txBody>
-      </p:sp>
-      <p:pic>
-        <p:nvPicPr>
-          <p:cNvPr id="7" name="Content Placeholder 6">
-            <a:extLst>
-              <a:ext uri="{FF2B5EF4-FFF2-40B4-BE49-F238E27FC236}">
-                <a16:creationId xmlns:a16="http://schemas.microsoft.com/office/drawing/2014/main" id="{AD91275A-A232-AC47-B7F4-AA334A33065F}"/>
-              </a:ext>
-            </a:extLst>
-          </p:cNvPr>
-          <p:cNvPicPr>
-            <a:picLocks noGrp="1" noChangeAspect="1"/>
-          </p:cNvPicPr>
-          <p:nvPr>
-            <p:ph idx="1"/>
-          </p:nvPr>
-        </p:nvPicPr>
-        <p:blipFill>
-          <a:blip r:embed="rId2"/>
-          <a:stretch>
-            <a:fillRect/>
-          </a:stretch>
-        </p:blipFill>
+      <p:sp useBgFill="1">
+        <p:nvSpPr>
+          <p:cNvPr id="8" name="Rectangle 7">
+            <a:extLst>
+              <a:ext uri="{FF2B5EF4-FFF2-40B4-BE49-F238E27FC236}">
+                <a16:creationId xmlns:a16="http://schemas.microsoft.com/office/drawing/2014/main" id="{09588DA8-065E-4F6F-8EFD-43104AB2E0CF}"/>
+              </a:ext>
+              <a:ext uri="{C183D7F6-B498-43B3-948B-1728B52AA6E4}">
+                <adec:decorative xmlns:adec="http://schemas.microsoft.com/office/drawing/2017/decorative" val="1"/>
+              </a:ext>
+            </a:extLst>
+          </p:cNvPr>
+          <p:cNvSpPr>
+            <a:spLocks noGrp="1" noRot="1" noChangeAspect="1" noMove="1" noResize="1" noEditPoints="1" noAdjustHandles="1" noChangeArrowheads="1" noChangeShapeType="1" noTextEdit="1"/>
+          </p:cNvSpPr>
+          <p:nvPr>
+            <p:extLst>
+              <p:ext uri="{386F3935-93C4-4BCD-93E2-E3B085C9AB24}">
+                <p16:designElem xmlns:p16="http://schemas.microsoft.com/office/powerpoint/2015/main" val="1"/>
+              </p:ext>
+            </p:extLst>
+          </p:nvPr>
+        </p:nvSpPr>
         <p:spPr>
           <a:xfrm>
-            <a:off x="425450" y="1374511"/>
-            <a:ext cx="9512300" cy="1600200"/>
+            <a:off x="0" y="0"/>
+            <a:ext cx="12192000" cy="6858000"/>
           </a:xfrm>
           <a:prstGeom prst="rect">
             <a:avLst/>
           </a:prstGeom>
+          <a:ln w="12700" cap="flat" cmpd="sng" algn="ctr">
+            <a:noFill/>
+            <a:prstDash val="solid"/>
+            <a:miter lim="800000"/>
+          </a:ln>
+          <a:effectLst/>
+          <a:extLst>
+            <a:ext uri="{91240B29-F687-4F45-9708-019B960494DF}">
+              <a14:hiddenLine xmlns:a14="http://schemas.microsoft.com/office/drawing/2010/main" w="12700" cap="flat" cmpd="sng" algn="ctr">
+                <a:solidFill>
+                  <a:schemeClr val="accent1">
+                    <a:shade val="50000"/>
+                  </a:schemeClr>
+                </a:solidFill>
+                <a:prstDash val="solid"/>
+                <a:miter lim="800000"/>
+              </a14:hiddenLine>
+            </a:ext>
+          </a:extLst>
         </p:spPr>
-      </p:pic>
-      <p:sp>
-        <p:nvSpPr>
-          <p:cNvPr id="11" name="TextBox 10">
-            <a:extLst>
-              <a:ext uri="{FF2B5EF4-FFF2-40B4-BE49-F238E27FC236}">
-                <a16:creationId xmlns:a16="http://schemas.microsoft.com/office/drawing/2014/main" id="{505BC354-6ED4-3B4D-9A58-E3CFD4FEA03E}"/>
-              </a:ext>
-            </a:extLst>
-          </p:cNvPr>
-          <p:cNvSpPr txBox="1"/>
-          <p:nvPr/>
+        <p:style>
+          <a:lnRef idx="2">
+            <a:schemeClr val="accent1">
+              <a:shade val="50000"/>
+            </a:schemeClr>
+          </a:lnRef>
+          <a:fillRef idx="1">
+            <a:schemeClr val="accent1"/>
+          </a:fillRef>
+          <a:effectRef idx="0">
+            <a:schemeClr val="accent1"/>
+          </a:effectRef>
+          <a:fontRef idx="minor">
+            <a:schemeClr val="lt1"/>
+          </a:fontRef>
+        </p:style>
+        <p:txBody>
+          <a:bodyPr rtlCol="0" anchor="ctr"/>
+          <a:lstStyle/>
+          <a:p>
+            <a:pPr algn="ctr"/>
+            <a:endParaRPr lang="en-US"/>
+          </a:p>
+        </p:txBody>
+      </p:sp>
+      <p:sp useBgFill="1">
+        <p:nvSpPr>
+          <p:cNvPr id="10" name="Rectangle 9">
+            <a:extLst>
+              <a:ext uri="{FF2B5EF4-FFF2-40B4-BE49-F238E27FC236}">
+                <a16:creationId xmlns:a16="http://schemas.microsoft.com/office/drawing/2014/main" id="{C4285719-470E-454C-AF62-8323075F1F5B}"/>
+              </a:ext>
+              <a:ext uri="{C183D7F6-B498-43B3-948B-1728B52AA6E4}">
+                <adec:decorative xmlns:adec="http://schemas.microsoft.com/office/drawing/2017/decorative" val="1"/>
+              </a:ext>
+            </a:extLst>
+          </p:cNvPr>
+          <p:cNvSpPr>
+            <a:spLocks noGrp="1" noRot="1" noChangeAspect="1" noMove="1" noResize="1" noEditPoints="1" noAdjustHandles="1" noChangeArrowheads="1" noChangeShapeType="1" noTextEdit="1"/>
+          </p:cNvSpPr>
+          <p:nvPr>
+            <p:extLst>
+              <p:ext uri="{386F3935-93C4-4BCD-93E2-E3B085C9AB24}">
+                <p16:designElem xmlns:p16="http://schemas.microsoft.com/office/powerpoint/2015/main" val="1"/>
+              </p:ext>
+            </p:extLst>
+          </p:nvPr>
         </p:nvSpPr>
         <p:spPr>
           <a:xfrm>
-            <a:off x="685800" y="3086100"/>
-            <a:ext cx="10732169" cy="646331"/>
+            <a:off x="0" y="0"/>
+            <a:ext cx="12188952" cy="6858000"/>
           </a:xfrm>
           <a:prstGeom prst="rect">
             <a:avLst/>
           </a:prstGeom>
-          <a:noFill/>
+          <a:ln w="12700" cap="flat" cmpd="sng" algn="ctr">
+            <a:noFill/>
+            <a:prstDash val="solid"/>
+            <a:miter lim="800000"/>
+          </a:ln>
+          <a:effectLst/>
+          <a:extLst>
+            <a:ext uri="{91240B29-F687-4F45-9708-019B960494DF}">
+              <a14:hiddenLine xmlns:a14="http://schemas.microsoft.com/office/drawing/2010/main" w="12700" cap="flat" cmpd="sng" algn="ctr">
+                <a:solidFill>
+                  <a:schemeClr val="accent1">
+                    <a:shade val="50000"/>
+                  </a:schemeClr>
+                </a:solidFill>
+                <a:prstDash val="solid"/>
+                <a:miter lim="800000"/>
+              </a14:hiddenLine>
+            </a:ext>
+          </a:extLst>
         </p:spPr>
-        <p:txBody>
-          <a:bodyPr wrap="none" rtlCol="0">
-            <a:spAutoFit/>
-          </a:bodyPr>
-          <a:lstStyle/>
-          <a:p>
-            <a:r>
-              <a:rPr lang="en-US" dirty="0"/>
-              <a:t>From the above DFG we make one of the transition as a restriction and write an algorithm to detect the violated </a:t>
-            </a:r>
-          </a:p>
-          <a:p>
-            <a:r>
-              <a:rPr lang="en-US" dirty="0"/>
-              <a:t>constraints as seen below ..</a:t>
-            </a:r>
-          </a:p>
-        </p:txBody>
-      </p:sp>
-      <p:pic>
-        <p:nvPicPr>
-          <p:cNvPr id="13" name="Picture 12">
-            <a:extLst>
-              <a:ext uri="{FF2B5EF4-FFF2-40B4-BE49-F238E27FC236}">
-                <a16:creationId xmlns:a16="http://schemas.microsoft.com/office/drawing/2014/main" id="{F2F9B300-C639-B94E-91F2-C976CC21AF4A}"/>
-              </a:ext>
-            </a:extLst>
-          </p:cNvPr>
-          <p:cNvPicPr>
-            <a:picLocks noChangeAspect="1"/>
-          </p:cNvPicPr>
-          <p:nvPr/>
-        </p:nvPicPr>
-        <p:blipFill>
-          <a:blip r:embed="rId3"/>
-          <a:stretch>
-            <a:fillRect/>
-          </a:stretch>
-        </p:blipFill>
+        <p:style>
+          <a:lnRef idx="2">
+            <a:schemeClr val="accent1">
+              <a:shade val="50000"/>
+            </a:schemeClr>
+          </a:lnRef>
+          <a:fillRef idx="1">
+            <a:schemeClr val="accent1"/>
+          </a:fillRef>
+          <a:effectRef idx="0">
+            <a:schemeClr val="accent1"/>
+          </a:effectRef>
+          <a:fontRef idx="minor">
+            <a:schemeClr val="lt1"/>
+          </a:fontRef>
+        </p:style>
+        <p:txBody>
+          <a:bodyPr rtlCol="0" anchor="ctr"/>
+          <a:lstStyle/>
+          <a:p>
+            <a:pPr algn="ctr"/>
+            <a:endParaRPr lang="en-US"/>
+          </a:p>
+        </p:txBody>
+      </p:sp>
+      <p:sp>
+        <p:nvSpPr>
+          <p:cNvPr id="12" name="Rectangle 11">
+            <a:extLst>
+              <a:ext uri="{FF2B5EF4-FFF2-40B4-BE49-F238E27FC236}">
+                <a16:creationId xmlns:a16="http://schemas.microsoft.com/office/drawing/2014/main" id="{CD9FE4EF-C4D8-49A0-B2FF-81D8DB7D8A24}"/>
+              </a:ext>
+              <a:ext uri="{C183D7F6-B498-43B3-948B-1728B52AA6E4}">
+                <adec:decorative xmlns:adec="http://schemas.microsoft.com/office/drawing/2017/decorative" val="1"/>
+              </a:ext>
+            </a:extLst>
+          </p:cNvPr>
+          <p:cNvSpPr>
+            <a:spLocks noGrp="1" noRot="1" noChangeAspect="1" noMove="1" noResize="1" noEditPoints="1" noAdjustHandles="1" noChangeArrowheads="1" noChangeShapeType="1" noTextEdit="1"/>
+          </p:cNvSpPr>
+          <p:nvPr>
+            <p:extLst>
+              <p:ext uri="{386F3935-93C4-4BCD-93E2-E3B085C9AB24}">
+                <p16:designElem xmlns:p16="http://schemas.microsoft.com/office/powerpoint/2015/main" val="1"/>
+              </p:ext>
+            </p:extLst>
+          </p:nvPr>
+        </p:nvSpPr>
         <p:spPr>
-          <a:xfrm>
-            <a:off x="425449" y="3732430"/>
-            <a:ext cx="10581217" cy="2952569"/>
+          <a:xfrm rot="5400000" flipH="1">
+            <a:off x="-1410084" y="1410082"/>
+            <a:ext cx="6858000" cy="4037836"/>
           </a:xfrm>
           <a:prstGeom prst="rect">
             <a:avLst/>
           </a:prstGeom>
+          <a:gradFill>
+            <a:gsLst>
+              <a:gs pos="8000">
+                <a:srgbClr val="000000"/>
+              </a:gs>
+              <a:gs pos="100000">
+                <a:schemeClr val="accent1">
+                  <a:lumMod val="75000"/>
+                </a:schemeClr>
+              </a:gs>
+            </a:gsLst>
+            <a:lin ang="3000000" scaled="0"/>
+          </a:gradFill>
+          <a:ln>
+            <a:noFill/>
+          </a:ln>
         </p:spPr>
-      </p:pic>
+        <p:style>
+          <a:lnRef idx="2">
+            <a:schemeClr val="accent1">
+              <a:shade val="50000"/>
+            </a:schemeClr>
+          </a:lnRef>
+          <a:fillRef idx="1">
+            <a:schemeClr val="accent1"/>
+          </a:fillRef>
+          <a:effectRef idx="0">
+            <a:schemeClr val="accent1"/>
+          </a:effectRef>
+          <a:fontRef idx="minor">
+            <a:schemeClr val="lt1"/>
+          </a:fontRef>
+        </p:style>
+        <p:txBody>
+          <a:bodyPr rtlCol="0" anchor="ctr"/>
+          <a:lstStyle/>
+          <a:p>
+            <a:pPr algn="ctr"/>
+            <a:endParaRPr lang="en-US"/>
+          </a:p>
+        </p:txBody>
+      </p:sp>
+      <p:sp>
+        <p:nvSpPr>
+          <p:cNvPr id="14" name="Rectangle 13">
+            <a:extLst>
+              <a:ext uri="{FF2B5EF4-FFF2-40B4-BE49-F238E27FC236}">
+                <a16:creationId xmlns:a16="http://schemas.microsoft.com/office/drawing/2014/main" id="{4300840D-0A0B-4512-BACA-B439D5B9C57C}"/>
+              </a:ext>
+              <a:ext uri="{C183D7F6-B498-43B3-948B-1728B52AA6E4}">
+                <adec:decorative xmlns:adec="http://schemas.microsoft.com/office/drawing/2017/decorative" val="1"/>
+              </a:ext>
+            </a:extLst>
+          </p:cNvPr>
+          <p:cNvSpPr>
+            <a:spLocks noGrp="1" noRot="1" noChangeAspect="1" noMove="1" noResize="1" noEditPoints="1" noAdjustHandles="1" noChangeArrowheads="1" noChangeShapeType="1" noTextEdit="1"/>
+          </p:cNvSpPr>
+          <p:nvPr>
+            <p:extLst>
+              <p:ext uri="{386F3935-93C4-4BCD-93E2-E3B085C9AB24}">
+                <p16:designElem xmlns:p16="http://schemas.microsoft.com/office/powerpoint/2015/main" val="1"/>
+              </p:ext>
+            </p:extLst>
+          </p:nvPr>
+        </p:nvSpPr>
+        <p:spPr>
+          <a:xfrm rot="5400000" flipH="1">
+            <a:off x="-1410085" y="1420219"/>
+            <a:ext cx="6857999" cy="4037839"/>
+          </a:xfrm>
+          <a:prstGeom prst="rect">
+            <a:avLst/>
+          </a:prstGeom>
+          <a:gradFill>
+            <a:gsLst>
+              <a:gs pos="0">
+                <a:srgbClr val="000000">
+                  <a:alpha val="0"/>
+                </a:srgbClr>
+              </a:gs>
+              <a:gs pos="99000">
+                <a:schemeClr val="accent1">
+                  <a:alpha val="46000"/>
+                </a:schemeClr>
+              </a:gs>
+            </a:gsLst>
+            <a:lin ang="1800000" scaled="0"/>
+          </a:gradFill>
+          <a:ln>
+            <a:noFill/>
+          </a:ln>
+        </p:spPr>
+        <p:style>
+          <a:lnRef idx="2">
+            <a:schemeClr val="accent1">
+              <a:shade val="50000"/>
+            </a:schemeClr>
+          </a:lnRef>
+          <a:fillRef idx="1">
+            <a:schemeClr val="accent1"/>
+          </a:fillRef>
+          <a:effectRef idx="0">
+            <a:schemeClr val="accent1"/>
+          </a:effectRef>
+          <a:fontRef idx="minor">
+            <a:schemeClr val="lt1"/>
+          </a:fontRef>
+        </p:style>
+        <p:txBody>
+          <a:bodyPr rtlCol="0" anchor="ctr"/>
+          <a:lstStyle/>
+          <a:p>
+            <a:pPr algn="ctr"/>
+            <a:endParaRPr lang="en-US"/>
+          </a:p>
+        </p:txBody>
+      </p:sp>
+      <p:sp>
+        <p:nvSpPr>
+          <p:cNvPr id="16" name="Rectangle 15">
+            <a:extLst>
+              <a:ext uri="{FF2B5EF4-FFF2-40B4-BE49-F238E27FC236}">
+                <a16:creationId xmlns:a16="http://schemas.microsoft.com/office/drawing/2014/main" id="{D2B78728-A580-49A7-84F9-6EF6F583ADE0}"/>
+              </a:ext>
+              <a:ext uri="{C183D7F6-B498-43B3-948B-1728B52AA6E4}">
+                <adec:decorative xmlns:adec="http://schemas.microsoft.com/office/drawing/2017/decorative" val="1"/>
+              </a:ext>
+            </a:extLst>
+          </p:cNvPr>
+          <p:cNvSpPr>
+            <a:spLocks noGrp="1" noRot="1" noChangeAspect="1" noMove="1" noResize="1" noEditPoints="1" noAdjustHandles="1" noChangeArrowheads="1" noChangeShapeType="1" noTextEdit="1"/>
+          </p:cNvSpPr>
+          <p:nvPr>
+            <p:extLst>
+              <p:ext uri="{386F3935-93C4-4BCD-93E2-E3B085C9AB24}">
+                <p16:designElem xmlns:p16="http://schemas.microsoft.com/office/powerpoint/2015/main" val="1"/>
+              </p:ext>
+            </p:extLst>
+          </p:nvPr>
+        </p:nvSpPr>
+        <p:spPr>
+          <a:xfrm rot="5400000" flipH="1">
+            <a:off x="767923" y="3588085"/>
+            <a:ext cx="2501979" cy="4037841"/>
+          </a:xfrm>
+          <a:prstGeom prst="rect">
+            <a:avLst/>
+          </a:prstGeom>
+          <a:gradFill>
+            <a:gsLst>
+              <a:gs pos="2000">
+                <a:schemeClr val="accent1">
+                  <a:alpha val="29000"/>
+                </a:schemeClr>
+              </a:gs>
+              <a:gs pos="100000">
+                <a:srgbClr val="000000">
+                  <a:alpha val="30000"/>
+                </a:srgbClr>
+              </a:gs>
+            </a:gsLst>
+            <a:lin ang="7800000" scaled="0"/>
+          </a:gradFill>
+          <a:ln>
+            <a:noFill/>
+          </a:ln>
+        </p:spPr>
+        <p:style>
+          <a:lnRef idx="2">
+            <a:schemeClr val="accent1">
+              <a:shade val="50000"/>
+            </a:schemeClr>
+          </a:lnRef>
+          <a:fillRef idx="1">
+            <a:schemeClr val="accent1"/>
+          </a:fillRef>
+          <a:effectRef idx="0">
+            <a:schemeClr val="accent1"/>
+          </a:effectRef>
+          <a:fontRef idx="minor">
+            <a:schemeClr val="lt1"/>
+          </a:fontRef>
+        </p:style>
+        <p:txBody>
+          <a:bodyPr rtlCol="0" anchor="ctr"/>
+          <a:lstStyle/>
+          <a:p>
+            <a:pPr algn="ctr"/>
+            <a:endParaRPr lang="en-US" dirty="0"/>
+          </a:p>
+        </p:txBody>
+      </p:sp>
+      <p:sp>
+        <p:nvSpPr>
+          <p:cNvPr id="18" name="Freeform: Shape 17">
+            <a:extLst>
+              <a:ext uri="{FF2B5EF4-FFF2-40B4-BE49-F238E27FC236}">
+                <a16:creationId xmlns:a16="http://schemas.microsoft.com/office/drawing/2014/main" id="{38FAA1A1-D861-433F-88FA-1E9D6FD31D11}"/>
+              </a:ext>
+              <a:ext uri="{C183D7F6-B498-43B3-948B-1728B52AA6E4}">
+                <adec:decorative xmlns:adec="http://schemas.microsoft.com/office/drawing/2017/decorative" val="1"/>
+              </a:ext>
+            </a:extLst>
+          </p:cNvPr>
+          <p:cNvSpPr>
+            <a:spLocks noGrp="1" noRot="1" noChangeAspect="1" noMove="1" noResize="1" noEditPoints="1" noAdjustHandles="1" noChangeArrowheads="1" noChangeShapeType="1" noTextEdit="1"/>
+          </p:cNvSpPr>
+          <p:nvPr>
+            <p:extLst>
+              <p:ext uri="{386F3935-93C4-4BCD-93E2-E3B085C9AB24}">
+                <p16:designElem xmlns:p16="http://schemas.microsoft.com/office/powerpoint/2015/main" val="1"/>
+              </p:ext>
+            </p:extLst>
+          </p:nvPr>
+        </p:nvSpPr>
+        <p:spPr>
+          <a:xfrm rot="20635413">
+            <a:off x="-501737" y="969718"/>
+            <a:ext cx="3900357" cy="4178958"/>
+          </a:xfrm>
+          <a:custGeom>
+            <a:avLst/>
+            <a:gdLst>
+              <a:gd name="connsiteX0" fmla="*/ 2432225 w 3900357"/>
+              <a:gd name="connsiteY0" fmla="*/ 93939 h 4178958"/>
+              <a:gd name="connsiteX1" fmla="*/ 3900357 w 3900357"/>
+              <a:gd name="connsiteY1" fmla="*/ 2089479 h 4178958"/>
+              <a:gd name="connsiteX2" fmla="*/ 1810878 w 3900357"/>
+              <a:gd name="connsiteY2" fmla="*/ 4178958 h 4178958"/>
+              <a:gd name="connsiteX3" fmla="*/ 78249 w 3900357"/>
+              <a:gd name="connsiteY3" fmla="*/ 3257727 h 4178958"/>
+              <a:gd name="connsiteX4" fmla="*/ 0 w 3900357"/>
+              <a:gd name="connsiteY4" fmla="*/ 3128923 h 4178958"/>
+              <a:gd name="connsiteX5" fmla="*/ 831324 w 3900357"/>
+              <a:gd name="connsiteY5" fmla="*/ 244281 h 4178958"/>
+              <a:gd name="connsiteX6" fmla="*/ 997559 w 3900357"/>
+              <a:gd name="connsiteY6" fmla="*/ 164202 h 4178958"/>
+              <a:gd name="connsiteX7" fmla="*/ 1810878 w 3900357"/>
+              <a:gd name="connsiteY7" fmla="*/ 0 h 4178958"/>
+              <a:gd name="connsiteX8" fmla="*/ 2432225 w 3900357"/>
+              <a:gd name="connsiteY8" fmla="*/ 93939 h 4178958"/>
+            </a:gdLst>
+            <a:ahLst/>
+            <a:cxnLst>
+              <a:cxn ang="0">
+                <a:pos x="connsiteX0" y="connsiteY0"/>
+              </a:cxn>
+              <a:cxn ang="0">
+                <a:pos x="connsiteX1" y="connsiteY1"/>
+              </a:cxn>
+              <a:cxn ang="0">
+                <a:pos x="connsiteX2" y="connsiteY2"/>
+              </a:cxn>
+              <a:cxn ang="0">
+                <a:pos x="connsiteX3" y="connsiteY3"/>
+              </a:cxn>
+              <a:cxn ang="0">
+                <a:pos x="connsiteX4" y="connsiteY4"/>
+              </a:cxn>
+              <a:cxn ang="0">
+                <a:pos x="connsiteX5" y="connsiteY5"/>
+              </a:cxn>
+              <a:cxn ang="0">
+                <a:pos x="connsiteX6" y="connsiteY6"/>
+              </a:cxn>
+              <a:cxn ang="0">
+                <a:pos x="connsiteX7" y="connsiteY7"/>
+              </a:cxn>
+              <a:cxn ang="0">
+                <a:pos x="connsiteX8" y="connsiteY8"/>
+              </a:cxn>
+            </a:cxnLst>
+            <a:rect l="l" t="t" r="r" b="b"/>
+            <a:pathLst>
+              <a:path w="3900357" h="4178958">
+                <a:moveTo>
+                  <a:pt x="2432225" y="93939"/>
+                </a:moveTo>
+                <a:cubicBezTo>
+                  <a:pt x="3282786" y="358491"/>
+                  <a:pt x="3900357" y="1151865"/>
+                  <a:pt x="3900357" y="2089479"/>
+                </a:cubicBezTo>
+                <a:cubicBezTo>
+                  <a:pt x="3900357" y="3243466"/>
+                  <a:pt x="2964865" y="4178958"/>
+                  <a:pt x="1810878" y="4178958"/>
+                </a:cubicBezTo>
+                <a:cubicBezTo>
+                  <a:pt x="1089636" y="4178958"/>
+                  <a:pt x="453744" y="3813531"/>
+                  <a:pt x="78249" y="3257727"/>
+                </a:cubicBezTo>
+                <a:lnTo>
+                  <a:pt x="0" y="3128923"/>
+                </a:lnTo>
+                <a:lnTo>
+                  <a:pt x="831324" y="244281"/>
+                </a:lnTo>
+                <a:lnTo>
+                  <a:pt x="997559" y="164202"/>
+                </a:lnTo>
+                <a:cubicBezTo>
+                  <a:pt x="1247540" y="58468"/>
+                  <a:pt x="1522381" y="0"/>
+                  <a:pt x="1810878" y="0"/>
+                </a:cubicBezTo>
+                <a:cubicBezTo>
+                  <a:pt x="2027251" y="0"/>
+                  <a:pt x="2235942" y="32888"/>
+                  <a:pt x="2432225" y="93939"/>
+                </a:cubicBezTo>
+                <a:close/>
+              </a:path>
+            </a:pathLst>
+          </a:custGeom>
+          <a:gradFill>
+            <a:gsLst>
+              <a:gs pos="29000">
+                <a:srgbClr val="000000">
+                  <a:alpha val="0"/>
+                </a:srgbClr>
+              </a:gs>
+              <a:gs pos="100000">
+                <a:schemeClr val="accent1">
+                  <a:alpha val="43000"/>
+                </a:schemeClr>
+              </a:gs>
+            </a:gsLst>
+            <a:lin ang="1800000" scaled="0"/>
+          </a:gradFill>
+          <a:ln>
+            <a:noFill/>
+          </a:ln>
+        </p:spPr>
+        <p:style>
+          <a:lnRef idx="2">
+            <a:schemeClr val="accent1">
+              <a:shade val="50000"/>
+            </a:schemeClr>
+          </a:lnRef>
+          <a:fillRef idx="1">
+            <a:schemeClr val="accent1"/>
+          </a:fillRef>
+          <a:effectRef idx="0">
+            <a:schemeClr val="accent1"/>
+          </a:effectRef>
+          <a:fontRef idx="minor">
+            <a:schemeClr val="lt1"/>
+          </a:fontRef>
+        </p:style>
+        <p:txBody>
+          <a:bodyPr wrap="square" rtlCol="0" anchor="ctr">
+            <a:noAutofit/>
+          </a:bodyPr>
+          <a:lstStyle/>
+          <a:p>
+            <a:pPr algn="ctr"/>
+            <a:endParaRPr lang="en-US" dirty="0"/>
+          </a:p>
+        </p:txBody>
+      </p:sp>
+      <p:sp>
+        <p:nvSpPr>
+          <p:cNvPr id="20" name="Rectangle 19">
+            <a:extLst>
+              <a:ext uri="{FF2B5EF4-FFF2-40B4-BE49-F238E27FC236}">
+                <a16:creationId xmlns:a16="http://schemas.microsoft.com/office/drawing/2014/main" id="{8D71EDA1-87BF-4D5D-AB79-F346FD19278A}"/>
+              </a:ext>
+              <a:ext uri="{C183D7F6-B498-43B3-948B-1728B52AA6E4}">
+                <adec:decorative xmlns:adec="http://schemas.microsoft.com/office/drawing/2017/decorative" val="1"/>
+              </a:ext>
+            </a:extLst>
+          </p:cNvPr>
+          <p:cNvSpPr>
+            <a:spLocks noGrp="1" noRot="1" noChangeAspect="1" noMove="1" noResize="1" noEditPoints="1" noAdjustHandles="1" noChangeArrowheads="1" noChangeShapeType="1" noTextEdit="1"/>
+          </p:cNvSpPr>
+          <p:nvPr>
+            <p:extLst>
+              <p:ext uri="{386F3935-93C4-4BCD-93E2-E3B085C9AB24}">
+                <p16:designElem xmlns:p16="http://schemas.microsoft.com/office/powerpoint/2015/main" val="1"/>
+              </p:ext>
+            </p:extLst>
+          </p:nvPr>
+        </p:nvSpPr>
+        <p:spPr>
+          <a:xfrm rot="5400000" flipH="1">
+            <a:off x="-1410093" y="1399943"/>
+            <a:ext cx="6858003" cy="4037835"/>
+          </a:xfrm>
+          <a:prstGeom prst="rect">
+            <a:avLst/>
+          </a:prstGeom>
+          <a:gradFill>
+            <a:gsLst>
+              <a:gs pos="0">
+                <a:srgbClr val="000000">
+                  <a:alpha val="0"/>
+                </a:srgbClr>
+              </a:gs>
+              <a:gs pos="99000">
+                <a:schemeClr val="accent1">
+                  <a:lumMod val="60000"/>
+                  <a:lumOff val="40000"/>
+                  <a:alpha val="11000"/>
+                </a:schemeClr>
+              </a:gs>
+            </a:gsLst>
+            <a:lin ang="7200000" scaled="0"/>
+          </a:gradFill>
+          <a:ln>
+            <a:noFill/>
+          </a:ln>
+        </p:spPr>
+        <p:style>
+          <a:lnRef idx="2">
+            <a:schemeClr val="accent1">
+              <a:shade val="50000"/>
+            </a:schemeClr>
+          </a:lnRef>
+          <a:fillRef idx="1">
+            <a:schemeClr val="accent1"/>
+          </a:fillRef>
+          <a:effectRef idx="0">
+            <a:schemeClr val="accent1"/>
+          </a:effectRef>
+          <a:fontRef idx="minor">
+            <a:schemeClr val="lt1"/>
+          </a:fontRef>
+        </p:style>
+        <p:txBody>
+          <a:bodyPr rtlCol="0" anchor="ctr"/>
+          <a:lstStyle/>
+          <a:p>
+            <a:pPr algn="ctr"/>
+            <a:endParaRPr lang="en-US"/>
+          </a:p>
+        </p:txBody>
+      </p:sp>
+      <p:sp>
+        <p:nvSpPr>
+          <p:cNvPr id="2" name="Title 1">
+            <a:extLst>
+              <a:ext uri="{FF2B5EF4-FFF2-40B4-BE49-F238E27FC236}">
+                <a16:creationId xmlns:a16="http://schemas.microsoft.com/office/drawing/2014/main" id="{F115E84D-4CF6-764E-B683-5847D4F19EB6}"/>
+              </a:ext>
+            </a:extLst>
+          </p:cNvPr>
+          <p:cNvSpPr>
+            <a:spLocks noGrp="1"/>
+          </p:cNvSpPr>
+          <p:nvPr>
+            <p:ph type="title"/>
+          </p:nvPr>
+        </p:nvSpPr>
+        <p:spPr>
+          <a:xfrm>
+            <a:off x="466722" y="586855"/>
+            <a:ext cx="3201366" cy="3387497"/>
+          </a:xfrm>
+        </p:spPr>
+        <p:txBody>
+          <a:bodyPr anchor="b">
+            <a:normAutofit/>
+          </a:bodyPr>
+          <a:lstStyle/>
+          <a:p>
+            <a:pPr algn="r"/>
+            <a:r>
+              <a:rPr lang="en-US" sz="3700">
+                <a:solidFill>
+                  <a:srgbClr val="FFFFFF"/>
+                </a:solidFill>
+              </a:rPr>
+              <a:t>Implementation</a:t>
+            </a:r>
+          </a:p>
+        </p:txBody>
+      </p:sp>
+      <p:sp>
+        <p:nvSpPr>
+          <p:cNvPr id="3" name="Content Placeholder 2">
+            <a:extLst>
+              <a:ext uri="{FF2B5EF4-FFF2-40B4-BE49-F238E27FC236}">
+                <a16:creationId xmlns:a16="http://schemas.microsoft.com/office/drawing/2014/main" id="{873C9FB5-57E0-EB47-A86D-7A7D46E4890E}"/>
+              </a:ext>
+            </a:extLst>
+          </p:cNvPr>
+          <p:cNvSpPr>
+            <a:spLocks noGrp="1"/>
+          </p:cNvSpPr>
+          <p:nvPr>
+            <p:ph idx="1"/>
+          </p:nvPr>
+        </p:nvSpPr>
+        <p:spPr>
+          <a:xfrm>
+            <a:off x="4810259" y="649480"/>
+            <a:ext cx="6555347" cy="5546047"/>
+          </a:xfrm>
+        </p:spPr>
+        <p:txBody>
+          <a:bodyPr anchor="ctr">
+            <a:normAutofit/>
+          </a:bodyPr>
+          <a:lstStyle/>
+          <a:p>
+            <a:r>
+              <a:rPr lang="en-US" sz="2000" dirty="0"/>
+              <a:t>Obtained </a:t>
+            </a:r>
+            <a:r>
+              <a:rPr lang="en-US" sz="2000" dirty="0" err="1"/>
+              <a:t>petrinet</a:t>
+            </a:r>
+            <a:r>
+              <a:rPr lang="en-US" sz="2000" dirty="0"/>
+              <a:t> from the </a:t>
+            </a:r>
+            <a:r>
+              <a:rPr lang="en-US" sz="2000" dirty="0" err="1"/>
+              <a:t>dfg</a:t>
+            </a:r>
+            <a:r>
+              <a:rPr lang="en-US" sz="2000" dirty="0"/>
+              <a:t>.</a:t>
+            </a:r>
+          </a:p>
+          <a:p>
+            <a:pPr marL="0" indent="0">
+              <a:buNone/>
+            </a:pPr>
+            <a:r>
+              <a:rPr lang="en-US" sz="2000" dirty="0"/>
+              <a:t>	 </a:t>
+            </a:r>
+            <a:r>
+              <a:rPr lang="en-US" sz="2000" b="1" dirty="0"/>
+              <a:t>Challenge</a:t>
+            </a:r>
+            <a:r>
+              <a:rPr lang="en-US" sz="2000" dirty="0"/>
+              <a:t>: Unable to find a function to visualize the 	</a:t>
+            </a:r>
+            <a:r>
+              <a:rPr lang="en-US" sz="2000" dirty="0" err="1"/>
+              <a:t>petrinet</a:t>
+            </a:r>
+            <a:r>
+              <a:rPr lang="en-US" sz="2000" dirty="0"/>
+              <a:t> by highlighting the edges violating it. </a:t>
+            </a:r>
+          </a:p>
+          <a:p>
+            <a:pPr marL="0" indent="0">
+              <a:buNone/>
+            </a:pPr>
+            <a:r>
+              <a:rPr lang="en-US" sz="2000" dirty="0"/>
+              <a:t>	</a:t>
+            </a:r>
+            <a:r>
+              <a:rPr lang="en-US" sz="2000" b="1" dirty="0"/>
+              <a:t>Possible solution</a:t>
+            </a:r>
+            <a:r>
+              <a:rPr lang="en-US" sz="2000" dirty="0"/>
+              <a:t>: write our own visualization 	function.</a:t>
+            </a:r>
+          </a:p>
+          <a:p>
+            <a:r>
+              <a:rPr lang="en-US" sz="2000" dirty="0"/>
+              <a:t>Implemented duplicate search at trace level/cycle detection.</a:t>
+            </a:r>
+          </a:p>
+          <a:p>
+            <a:r>
+              <a:rPr lang="en-US" sz="2000" dirty="0"/>
+              <a:t>Created a framework wherein each function is called step by step via main function.</a:t>
+            </a:r>
+          </a:p>
+        </p:txBody>
+      </p:sp>
     </p:spTree>
     <p:extLst>
       <p:ext uri="{BB962C8B-B14F-4D97-AF65-F5344CB8AC3E}">
-        <p14:creationId xmlns:p14="http://schemas.microsoft.com/office/powerpoint/2010/main" val="1621947193"/>
+        <p14:creationId xmlns:p14="http://schemas.microsoft.com/office/powerpoint/2010/main" val="1329395462"/>
       </p:ext>
     </p:extLst>
   </p:cSld>
@@ -3970,7 +4613,7 @@
           <p:cNvPr id="2" name="Title 1">
             <a:extLst>
               <a:ext uri="{FF2B5EF4-FFF2-40B4-BE49-F238E27FC236}">
-                <a16:creationId xmlns:a16="http://schemas.microsoft.com/office/drawing/2014/main" id="{F115E84D-4CF6-764E-B683-5847D4F19EB6}"/>
+                <a16:creationId xmlns:a16="http://schemas.microsoft.com/office/drawing/2014/main" id="{A05AB284-892D-2C4E-BC42-4962C7D7D784}"/>
               </a:ext>
             </a:extLst>
           </p:cNvPr>
@@ -3983,104 +4626,62 @@
         </p:nvSpPr>
         <p:spPr/>
         <p:txBody>
-          <a:bodyPr/>
+          <a:bodyPr>
+            <a:normAutofit fontScale="90000"/>
+          </a:bodyPr>
           <a:lstStyle/>
           <a:p>
             <a:r>
               <a:rPr lang="en-US" dirty="0"/>
-              <a:t>Implementation</a:t>
-            </a:r>
-          </a:p>
-        </p:txBody>
-      </p:sp>
-      <p:sp>
-        <p:nvSpPr>
-          <p:cNvPr id="3" name="Content Placeholder 2">
-            <a:extLst>
-              <a:ext uri="{FF2B5EF4-FFF2-40B4-BE49-F238E27FC236}">
-                <a16:creationId xmlns:a16="http://schemas.microsoft.com/office/drawing/2014/main" id="{873C9FB5-57E0-EB47-A86D-7A7D46E4890E}"/>
-              </a:ext>
-            </a:extLst>
-          </p:cNvPr>
-          <p:cNvSpPr>
-            <a:spLocks noGrp="1"/>
-          </p:cNvSpPr>
+              <a:t>Paper for</a:t>
+            </a:r>
+            <a:r>
+              <a:rPr lang="en-IN" dirty="0"/>
+              <a:t> Estimating the Impact of Incidents on Process Delay</a:t>
+            </a:r>
+            <a:br>
+              <a:rPr lang="en-IN" dirty="0"/>
+            </a:br>
+            <a:endParaRPr lang="en-US" dirty="0"/>
+          </a:p>
+        </p:txBody>
+      </p:sp>
+      <p:pic>
+        <p:nvPicPr>
+          <p:cNvPr id="4" name="Content Placeholder 3">
+            <a:extLst>
+              <a:ext uri="{FF2B5EF4-FFF2-40B4-BE49-F238E27FC236}">
+                <a16:creationId xmlns:a16="http://schemas.microsoft.com/office/drawing/2014/main" id="{FD0620B6-C03A-0440-89BB-3110D921E590}"/>
+              </a:ext>
+            </a:extLst>
+          </p:cNvPr>
+          <p:cNvPicPr>
+            <a:picLocks noGrp="1" noChangeAspect="1"/>
+          </p:cNvPicPr>
           <p:nvPr>
             <p:ph idx="1"/>
           </p:nvPr>
-        </p:nvSpPr>
-        <p:spPr/>
-        <p:txBody>
-          <a:bodyPr/>
-          <a:lstStyle/>
-          <a:p>
-            <a:r>
-              <a:rPr lang="en-US" dirty="0"/>
-              <a:t>Obtained </a:t>
-            </a:r>
-            <a:r>
-              <a:rPr lang="en-US" dirty="0" err="1"/>
-              <a:t>petrinet</a:t>
-            </a:r>
-            <a:r>
-              <a:rPr lang="en-US" dirty="0"/>
-              <a:t> from the </a:t>
-            </a:r>
-            <a:r>
-              <a:rPr lang="en-US" dirty="0" err="1"/>
-              <a:t>dfg</a:t>
-            </a:r>
-            <a:r>
-              <a:rPr lang="en-US" dirty="0"/>
-              <a:t>.</a:t>
-            </a:r>
-          </a:p>
-          <a:p>
-            <a:pPr marL="0" indent="0">
-              <a:buNone/>
-            </a:pPr>
-            <a:r>
-              <a:rPr lang="en-US" dirty="0"/>
-              <a:t>	 Challenge: Unable to find a function to visualize the </a:t>
-            </a:r>
-            <a:r>
-              <a:rPr lang="en-US" dirty="0" err="1"/>
-              <a:t>petrinet</a:t>
-            </a:r>
-            <a:r>
-              <a:rPr lang="en-US" dirty="0"/>
-              <a:t> by 	highlighting the edges violating it. </a:t>
-            </a:r>
-          </a:p>
-          <a:p>
-            <a:pPr marL="0" indent="0">
-              <a:buNone/>
-            </a:pPr>
-            <a:r>
-              <a:rPr lang="en-US" dirty="0"/>
-              <a:t>	possible solution: write our own visualization function.</a:t>
-            </a:r>
-          </a:p>
-          <a:p>
-            <a:r>
-              <a:rPr lang="en-US" dirty="0"/>
-              <a:t>Implemented duplicate search at </a:t>
-            </a:r>
-            <a:r>
-              <a:rPr lang="en-US"/>
-              <a:t>trace level/cycle </a:t>
-            </a:r>
-            <a:r>
-              <a:rPr lang="en-US" dirty="0"/>
-              <a:t>detection.</a:t>
-            </a:r>
-          </a:p>
-        </p:txBody>
-      </p:sp>
+        </p:nvPicPr>
+        <p:blipFill>
+          <a:blip r:embed="rId2"/>
+          <a:stretch>
+            <a:fillRect/>
+          </a:stretch>
+        </p:blipFill>
+        <p:spPr>
+          <a:xfrm>
+            <a:off x="3206750" y="2375694"/>
+            <a:ext cx="5778500" cy="3251200"/>
+          </a:xfrm>
+          <a:prstGeom prst="rect">
+            <a:avLst/>
+          </a:prstGeom>
+        </p:spPr>
+      </p:pic>
     </p:spTree>
     <p:extLst>
       <p:ext uri="{BB962C8B-B14F-4D97-AF65-F5344CB8AC3E}">
-        <p14:creationId xmlns:p14="http://schemas.microsoft.com/office/powerpoint/2010/main" val="1329395462"/>
+        <p14:creationId xmlns:p14="http://schemas.microsoft.com/office/powerpoint/2010/main" val="4074100120"/>
       </p:ext>
     </p:extLst>
   </p:cSld>
@@ -4319,33 +4920,7 @@
                   <a:srgbClr val="000000"/>
                 </a:solidFill>
               </a:rPr>
-              <a:t>Use the DFG obtained and try to get the </a:t>
-            </a:r>
-            <a:r>
-              <a:rPr lang="en-US" sz="2000" dirty="0" err="1">
-                <a:solidFill>
-                  <a:srgbClr val="000000"/>
-                </a:solidFill>
-              </a:rPr>
-              <a:t>Petrinet</a:t>
-            </a:r>
-            <a:r>
-              <a:rPr lang="en-US" sz="2000" dirty="0">
-                <a:solidFill>
-                  <a:srgbClr val="000000"/>
-                </a:solidFill>
-              </a:rPr>
-              <a:t> using inductive miner algorithm.</a:t>
-            </a:r>
-          </a:p>
-          <a:p>
-            <a:r>
-              <a:rPr lang="en-US" sz="2000" dirty="0">
-                <a:solidFill>
-                  <a:srgbClr val="000000"/>
-                </a:solidFill>
-              </a:rPr>
-              <a:t>Also try to set a parameter which says if that transition is violated and acter the discovery try to color the violated constraints.</a:t>
+              <a:t>Try to set a parameter which says if that transition is violated and after the discovery try to color the violated constraints.</a:t>
             </a:r>
           </a:p>
           <a:p>
@@ -4359,11 +4934,30 @@
             </a:r>
           </a:p>
           <a:p>
-            <a:endParaRPr lang="en-US" sz="2000" dirty="0">
-              <a:solidFill>
-                <a:srgbClr val="000000"/>
-              </a:solidFill>
-            </a:endParaRPr>
+            <a:r>
+              <a:rPr lang="en-US" sz="2000" dirty="0">
+                <a:solidFill>
+                  <a:srgbClr val="000000"/>
+                </a:solidFill>
+              </a:rPr>
+              <a:t>Use these to build a </a:t>
+            </a:r>
+            <a:r>
+              <a:rPr lang="en-US" sz="2000" b="1" dirty="0">
+                <a:solidFill>
+                  <a:srgbClr val="000000"/>
+                </a:solidFill>
+              </a:rPr>
+              <a:t>visualizer</a:t>
+            </a:r>
+            <a:r>
+              <a:rPr lang="en-US" sz="2000" dirty="0">
+                <a:solidFill>
+                  <a:srgbClr val="000000"/>
+                </a:solidFill>
+              </a:rPr>
+              <a:t>.</a:t>
+            </a:r>
           </a:p>
         </p:txBody>
       </p:sp>
@@ -4851,90 +5445,6 @@
     <p:extLst>
       <p:ext uri="{BB962C8B-B14F-4D97-AF65-F5344CB8AC3E}">
         <p14:creationId xmlns:p14="http://schemas.microsoft.com/office/powerpoint/2010/main" val="69600798"/>
-      </p:ext>
-    </p:extLst>
-  </p:cSld>
-  <p:clrMapOvr>
-    <a:masterClrMapping/>
-  </p:clrMapOvr>
-</p:sld>
-</file>
-
-<file path=ppt/slides/slide6.xml><?xml version="1.0" encoding="utf-8"?>
-<p:sld xmlns:a="http://schemas.openxmlformats.org/drawingml/2006/main" xmlns:r="http://schemas.openxmlformats.org/officeDocument/2006/relationships" xmlns:p="http://schemas.openxmlformats.org/presentationml/2006/main">
-  <p:cSld>
-    <p:spTree>
-      <p:nvGrpSpPr>
-        <p:cNvPr id="1" name=""/>
-        <p:cNvGrpSpPr/>
-        <p:nvPr/>
-      </p:nvGrpSpPr>
-      <p:grpSpPr>
-        <a:xfrm>
-          <a:off x="0" y="0"/>
-          <a:ext cx="0" cy="0"/>
-          <a:chOff x="0" y="0"/>
-          <a:chExt cx="0" cy="0"/>
-        </a:xfrm>
-      </p:grpSpPr>
-      <p:sp>
-        <p:nvSpPr>
-          <p:cNvPr id="2" name="Title 1">
-            <a:extLst>
-              <a:ext uri="{FF2B5EF4-FFF2-40B4-BE49-F238E27FC236}">
-                <a16:creationId xmlns:a16="http://schemas.microsoft.com/office/drawing/2014/main" id="{AE1D6C17-C214-0544-B1C7-C50A11D81699}"/>
-              </a:ext>
-            </a:extLst>
-          </p:cNvPr>
-          <p:cNvSpPr>
-            <a:spLocks noGrp="1"/>
-          </p:cNvSpPr>
-          <p:nvPr>
-            <p:ph type="title"/>
-          </p:nvPr>
-        </p:nvSpPr>
-        <p:spPr/>
-        <p:txBody>
-          <a:bodyPr/>
-          <a:lstStyle/>
-          <a:p>
-            <a:r>
-              <a:rPr lang="en-US" dirty="0" err="1"/>
-              <a:t>Github</a:t>
-            </a:r>
-            <a:endParaRPr lang="en-US" dirty="0"/>
-          </a:p>
-        </p:txBody>
-      </p:sp>
-      <p:sp>
-        <p:nvSpPr>
-          <p:cNvPr id="3" name="Content Placeholder 2">
-            <a:extLst>
-              <a:ext uri="{FF2B5EF4-FFF2-40B4-BE49-F238E27FC236}">
-                <a16:creationId xmlns:a16="http://schemas.microsoft.com/office/drawing/2014/main" id="{41BF6447-93A0-8840-8E24-098A6DBF75EB}"/>
-              </a:ext>
-            </a:extLst>
-          </p:cNvPr>
-          <p:cNvSpPr>
-            <a:spLocks noGrp="1"/>
-          </p:cNvSpPr>
-          <p:nvPr>
-            <p:ph idx="1"/>
-          </p:nvPr>
-        </p:nvSpPr>
-        <p:spPr/>
-        <p:txBody>
-          <a:bodyPr/>
-          <a:lstStyle/>
-          <a:p>
-            <a:endParaRPr lang="en-US" dirty="0"/>
-          </a:p>
-        </p:txBody>
-      </p:sp>
-    </p:spTree>
-    <p:extLst>
-      <p:ext uri="{BB962C8B-B14F-4D97-AF65-F5344CB8AC3E}">
-        <p14:creationId xmlns:p14="http://schemas.microsoft.com/office/powerpoint/2010/main" val="3431340783"/>
       </p:ext>
     </p:extLst>
   </p:cSld>

</xml_diff>